<commit_message>
Update Accordion docs (#1126)
Co-authored-by: Therese Stokkan <therese.stokkan@accenture.com>
</commit_message>
<xml_diff>
--- a/content/app/development/ux/components/numbered-callouts-anatomy.pptx
+++ b/content/app/development/ux/components/numbered-callouts-anatomy.pptx
@@ -8,6 +8,7 @@
     <p:sldId id="256" r:id="rId2"/>
     <p:sldId id="257" r:id="rId3"/>
     <p:sldId id="258" r:id="rId4"/>
+    <p:sldId id="259" r:id="rId5"/>
   </p:sldIdLst>
   <p:sldSz cx="12192000" cy="6858000"/>
   <p:notesSz cx="6858000" cy="9144000"/>
@@ -106,6 +107,11 @@
       </a:defRPr>
     </a:lvl9pPr>
   </p:defaultTextStyle>
+  <p:extLst>
+    <p:ext uri="{EFAFB233-063F-42B5-8137-9DF3F51BA10A}">
+      <p15:sldGuideLst xmlns:p15="http://schemas.microsoft.com/office/powerpoint/2012/main"/>
+    </p:ext>
+  </p:extLst>
 </p:presentation>
 </file>
 
@@ -258,7 +264,7 @@
           <a:p>
             <a:fld id="{8B9FE25B-AA82-4C44-8E19-2BE52C4871CE}" type="datetimeFigureOut">
               <a:rPr lang="en-NO" smtClean="0"/>
-              <a:t>04/09/2023</a:t>
+              <a:t>07/09/2023</a:t>
             </a:fld>
             <a:endParaRPr lang="en-NO"/>
           </a:p>
@@ -458,7 +464,7 @@
           <a:p>
             <a:fld id="{8B9FE25B-AA82-4C44-8E19-2BE52C4871CE}" type="datetimeFigureOut">
               <a:rPr lang="en-NO" smtClean="0"/>
-              <a:t>04/09/2023</a:t>
+              <a:t>07/09/2023</a:t>
             </a:fld>
             <a:endParaRPr lang="en-NO"/>
           </a:p>
@@ -668,7 +674,7 @@
           <a:p>
             <a:fld id="{8B9FE25B-AA82-4C44-8E19-2BE52C4871CE}" type="datetimeFigureOut">
               <a:rPr lang="en-NO" smtClean="0"/>
-              <a:t>04/09/2023</a:t>
+              <a:t>07/09/2023</a:t>
             </a:fld>
             <a:endParaRPr lang="en-NO"/>
           </a:p>
@@ -868,7 +874,7 @@
           <a:p>
             <a:fld id="{8B9FE25B-AA82-4C44-8E19-2BE52C4871CE}" type="datetimeFigureOut">
               <a:rPr lang="en-NO" smtClean="0"/>
-              <a:t>04/09/2023</a:t>
+              <a:t>07/09/2023</a:t>
             </a:fld>
             <a:endParaRPr lang="en-NO"/>
           </a:p>
@@ -1144,7 +1150,7 @@
           <a:p>
             <a:fld id="{8B9FE25B-AA82-4C44-8E19-2BE52C4871CE}" type="datetimeFigureOut">
               <a:rPr lang="en-NO" smtClean="0"/>
-              <a:t>04/09/2023</a:t>
+              <a:t>07/09/2023</a:t>
             </a:fld>
             <a:endParaRPr lang="en-NO"/>
           </a:p>
@@ -1412,7 +1418,7 @@
           <a:p>
             <a:fld id="{8B9FE25B-AA82-4C44-8E19-2BE52C4871CE}" type="datetimeFigureOut">
               <a:rPr lang="en-NO" smtClean="0"/>
-              <a:t>04/09/2023</a:t>
+              <a:t>07/09/2023</a:t>
             </a:fld>
             <a:endParaRPr lang="en-NO"/>
           </a:p>
@@ -1827,7 +1833,7 @@
           <a:p>
             <a:fld id="{8B9FE25B-AA82-4C44-8E19-2BE52C4871CE}" type="datetimeFigureOut">
               <a:rPr lang="en-NO" smtClean="0"/>
-              <a:t>04/09/2023</a:t>
+              <a:t>07/09/2023</a:t>
             </a:fld>
             <a:endParaRPr lang="en-NO"/>
           </a:p>
@@ -1969,7 +1975,7 @@
           <a:p>
             <a:fld id="{8B9FE25B-AA82-4C44-8E19-2BE52C4871CE}" type="datetimeFigureOut">
               <a:rPr lang="en-NO" smtClean="0"/>
-              <a:t>04/09/2023</a:t>
+              <a:t>07/09/2023</a:t>
             </a:fld>
             <a:endParaRPr lang="en-NO"/>
           </a:p>
@@ -2082,7 +2088,7 @@
           <a:p>
             <a:fld id="{8B9FE25B-AA82-4C44-8E19-2BE52C4871CE}" type="datetimeFigureOut">
               <a:rPr lang="en-NO" smtClean="0"/>
-              <a:t>04/09/2023</a:t>
+              <a:t>07/09/2023</a:t>
             </a:fld>
             <a:endParaRPr lang="en-NO"/>
           </a:p>
@@ -2395,7 +2401,7 @@
           <a:p>
             <a:fld id="{8B9FE25B-AA82-4C44-8E19-2BE52C4871CE}" type="datetimeFigureOut">
               <a:rPr lang="en-NO" smtClean="0"/>
-              <a:t>04/09/2023</a:t>
+              <a:t>07/09/2023</a:t>
             </a:fld>
             <a:endParaRPr lang="en-NO"/>
           </a:p>
@@ -2684,7 +2690,7 @@
           <a:p>
             <a:fld id="{8B9FE25B-AA82-4C44-8E19-2BE52C4871CE}" type="datetimeFigureOut">
               <a:rPr lang="en-NO" smtClean="0"/>
-              <a:t>04/09/2023</a:t>
+              <a:t>07/09/2023</a:t>
             </a:fld>
             <a:endParaRPr lang="en-NO"/>
           </a:p>
@@ -2927,7 +2933,7 @@
           <a:p>
             <a:fld id="{8B9FE25B-AA82-4C44-8E19-2BE52C4871CE}" type="datetimeFigureOut">
               <a:rPr lang="en-NO" smtClean="0"/>
-              <a:t>04/09/2023</a:t>
+              <a:t>07/09/2023</a:t>
             </a:fld>
             <a:endParaRPr lang="en-NO"/>
           </a:p>
@@ -6085,6 +6091,531 @@
 </p:sld>
 </file>
 
+<file path=ppt/slides/slide4.xml><?xml version="1.0" encoding="utf-8"?>
+<p:sld xmlns:a="http://schemas.openxmlformats.org/drawingml/2006/main" xmlns:r="http://schemas.openxmlformats.org/officeDocument/2006/relationships" xmlns:p="http://schemas.openxmlformats.org/presentationml/2006/main">
+  <p:cSld>
+    <p:spTree>
+      <p:nvGrpSpPr>
+        <p:cNvPr id="1" name=""/>
+        <p:cNvGrpSpPr/>
+        <p:nvPr/>
+      </p:nvGrpSpPr>
+      <p:grpSpPr>
+        <a:xfrm>
+          <a:off x="0" y="0"/>
+          <a:ext cx="0" cy="0"/>
+          <a:chOff x="0" y="0"/>
+          <a:chExt cx="0" cy="0"/>
+        </a:xfrm>
+      </p:grpSpPr>
+      <p:grpSp>
+        <p:nvGrpSpPr>
+          <p:cNvPr id="18" name="Group 17">
+            <a:extLst>
+              <a:ext uri="{FF2B5EF4-FFF2-40B4-BE49-F238E27FC236}">
+                <a16:creationId xmlns:a16="http://schemas.microsoft.com/office/drawing/2014/main" id="{89647EAE-D0AE-3A2C-C909-4948BBD99EA4}"/>
+              </a:ext>
+            </a:extLst>
+          </p:cNvPr>
+          <p:cNvGrpSpPr/>
+          <p:nvPr/>
+        </p:nvGrpSpPr>
+        <p:grpSpPr>
+          <a:xfrm>
+            <a:off x="1085248" y="749300"/>
+            <a:ext cx="8313873" cy="841652"/>
+            <a:chOff x="1085248" y="749300"/>
+            <a:chExt cx="8313873" cy="841652"/>
+          </a:xfrm>
+        </p:grpSpPr>
+        <p:pic>
+          <p:nvPicPr>
+            <p:cNvPr id="7" name="Picture 6">
+              <a:extLst>
+                <a:ext uri="{FF2B5EF4-FFF2-40B4-BE49-F238E27FC236}">
+                  <a16:creationId xmlns:a16="http://schemas.microsoft.com/office/drawing/2014/main" id="{937BF731-48AC-EEEB-6E91-A6D106CED09A}"/>
+                </a:ext>
+              </a:extLst>
+            </p:cNvPr>
+            <p:cNvPicPr>
+              <a:picLocks noChangeAspect="1"/>
+            </p:cNvPicPr>
+            <p:nvPr/>
+          </p:nvPicPr>
+          <p:blipFill>
+            <a:blip r:embed="rId2"/>
+            <a:stretch>
+              <a:fillRect/>
+            </a:stretch>
+          </p:blipFill>
+          <p:spPr>
+            <a:xfrm>
+              <a:off x="1626721" y="749300"/>
+              <a:ext cx="7772400" cy="841652"/>
+            </a:xfrm>
+            <a:prstGeom prst="rect">
+              <a:avLst/>
+            </a:prstGeom>
+          </p:spPr>
+        </p:pic>
+        <p:grpSp>
+          <p:nvGrpSpPr>
+            <p:cNvPr id="8" name="Group 7">
+              <a:extLst>
+                <a:ext uri="{FF2B5EF4-FFF2-40B4-BE49-F238E27FC236}">
+                  <a16:creationId xmlns:a16="http://schemas.microsoft.com/office/drawing/2014/main" id="{09938EEB-A0AB-CFB1-979A-CBF61A49267B}"/>
+                </a:ext>
+              </a:extLst>
+            </p:cNvPr>
+            <p:cNvGrpSpPr/>
+            <p:nvPr/>
+          </p:nvGrpSpPr>
+          <p:grpSpPr>
+            <a:xfrm>
+              <a:off x="1085248" y="1012360"/>
+              <a:ext cx="597425" cy="315531"/>
+              <a:chOff x="1226196" y="722949"/>
+              <a:chExt cx="597425" cy="315531"/>
+            </a:xfrm>
+          </p:grpSpPr>
+          <p:cxnSp>
+            <p:nvCxnSpPr>
+              <p:cNvPr id="9" name="Straight Arrow Connector 8">
+                <a:extLst>
+                  <a:ext uri="{FF2B5EF4-FFF2-40B4-BE49-F238E27FC236}">
+                    <a16:creationId xmlns:a16="http://schemas.microsoft.com/office/drawing/2014/main" id="{B2BE0A1F-B14C-A6AF-1DA8-098873C6F4F2}"/>
+                  </a:ext>
+                </a:extLst>
+              </p:cNvPr>
+              <p:cNvCxnSpPr>
+                <a:cxnSpLocks/>
+              </p:cNvCxnSpPr>
+              <p:nvPr/>
+            </p:nvCxnSpPr>
+            <p:spPr>
+              <a:xfrm flipH="1">
+                <a:off x="1391621" y="870363"/>
+                <a:ext cx="432000" cy="0"/>
+              </a:xfrm>
+              <a:prstGeom prst="straightConnector1">
+                <a:avLst/>
+              </a:prstGeom>
+              <a:solidFill>
+                <a:srgbClr val="FFFFFF"/>
+              </a:solidFill>
+              <a:ln w="19050">
+                <a:solidFill>
+                  <a:srgbClr val="0062BA"/>
+                </a:solidFill>
+                <a:headEnd type="oval" w="med" len="med"/>
+                <a:tailEnd type="oval" w="med" len="med"/>
+              </a:ln>
+            </p:spPr>
+            <p:style>
+              <a:lnRef idx="1">
+                <a:schemeClr val="accent1"/>
+              </a:lnRef>
+              <a:fillRef idx="0">
+                <a:schemeClr val="accent1"/>
+              </a:fillRef>
+              <a:effectRef idx="0">
+                <a:schemeClr val="accent1"/>
+              </a:effectRef>
+              <a:fontRef idx="minor">
+                <a:schemeClr val="tx1"/>
+              </a:fontRef>
+            </p:style>
+          </p:cxnSp>
+          <p:sp>
+            <p:nvSpPr>
+              <p:cNvPr id="10" name="Oval 9">
+                <a:extLst>
+                  <a:ext uri="{FF2B5EF4-FFF2-40B4-BE49-F238E27FC236}">
+                    <a16:creationId xmlns:a16="http://schemas.microsoft.com/office/drawing/2014/main" id="{2B27218E-7580-C2C1-1A8F-BAC071FC7BA2}"/>
+                  </a:ext>
+                </a:extLst>
+              </p:cNvPr>
+              <p:cNvSpPr/>
+              <p:nvPr/>
+            </p:nvSpPr>
+            <p:spPr>
+              <a:xfrm>
+                <a:off x="1226196" y="722949"/>
+                <a:ext cx="315531" cy="315531"/>
+              </a:xfrm>
+              <a:prstGeom prst="ellipse">
+                <a:avLst/>
+              </a:prstGeom>
+              <a:solidFill>
+                <a:srgbClr val="FFFFFF"/>
+              </a:solidFill>
+              <a:ln w="19050">
+                <a:solidFill>
+                  <a:srgbClr val="0062BA"/>
+                </a:solidFill>
+              </a:ln>
+            </p:spPr>
+            <p:style>
+              <a:lnRef idx="2">
+                <a:schemeClr val="accent1">
+                  <a:shade val="15000"/>
+                </a:schemeClr>
+              </a:lnRef>
+              <a:fillRef idx="1">
+                <a:schemeClr val="accent1"/>
+              </a:fillRef>
+              <a:effectRef idx="0">
+                <a:schemeClr val="accent1"/>
+              </a:effectRef>
+              <a:fontRef idx="minor">
+                <a:schemeClr val="lt1"/>
+              </a:fontRef>
+            </p:style>
+            <p:txBody>
+              <a:bodyPr rtlCol="0" anchor="ctr"/>
+              <a:lstStyle/>
+              <a:p>
+                <a:pPr algn="ctr"/>
+                <a:r>
+                  <a:rPr lang="en-NO" sz="1400" dirty="0">
+                    <a:solidFill>
+                      <a:srgbClr val="0062BA"/>
+                    </a:solidFill>
+                    <a:latin typeface="DIN Condensed" pitchFamily="2" charset="0"/>
+                  </a:rPr>
+                  <a:t>1</a:t>
+                </a:r>
+              </a:p>
+            </p:txBody>
+          </p:sp>
+        </p:grpSp>
+      </p:grpSp>
+      <p:grpSp>
+        <p:nvGrpSpPr>
+          <p:cNvPr id="17" name="Group 16">
+            <a:extLst>
+              <a:ext uri="{FF2B5EF4-FFF2-40B4-BE49-F238E27FC236}">
+                <a16:creationId xmlns:a16="http://schemas.microsoft.com/office/drawing/2014/main" id="{D723288D-7F34-A668-BB32-D8D7D3F55A0A}"/>
+              </a:ext>
+            </a:extLst>
+          </p:cNvPr>
+          <p:cNvGrpSpPr/>
+          <p:nvPr/>
+        </p:nvGrpSpPr>
+        <p:grpSpPr>
+          <a:xfrm>
+            <a:off x="1085248" y="2603500"/>
+            <a:ext cx="8313873" cy="2044012"/>
+            <a:chOff x="1085248" y="2603500"/>
+            <a:chExt cx="8313873" cy="2044012"/>
+          </a:xfrm>
+        </p:grpSpPr>
+        <p:pic>
+          <p:nvPicPr>
+            <p:cNvPr id="5" name="Picture 4" descr="A screenshot of a message&#10;&#10;Description automatically generated">
+              <a:extLst>
+                <a:ext uri="{FF2B5EF4-FFF2-40B4-BE49-F238E27FC236}">
+                  <a16:creationId xmlns:a16="http://schemas.microsoft.com/office/drawing/2014/main" id="{3171C17C-B40E-E795-D032-3007ACE8721A}"/>
+                </a:ext>
+              </a:extLst>
+            </p:cNvPr>
+            <p:cNvPicPr>
+              <a:picLocks noChangeAspect="1"/>
+            </p:cNvPicPr>
+            <p:nvPr/>
+          </p:nvPicPr>
+          <p:blipFill>
+            <a:blip r:embed="rId3"/>
+            <a:stretch>
+              <a:fillRect/>
+            </a:stretch>
+          </p:blipFill>
+          <p:spPr>
+            <a:xfrm>
+              <a:off x="1626721" y="2603500"/>
+              <a:ext cx="7772400" cy="2044012"/>
+            </a:xfrm>
+            <a:prstGeom prst="rect">
+              <a:avLst/>
+            </a:prstGeom>
+          </p:spPr>
+        </p:pic>
+        <p:grpSp>
+          <p:nvGrpSpPr>
+            <p:cNvPr id="11" name="Group 10">
+              <a:extLst>
+                <a:ext uri="{FF2B5EF4-FFF2-40B4-BE49-F238E27FC236}">
+                  <a16:creationId xmlns:a16="http://schemas.microsoft.com/office/drawing/2014/main" id="{03ADA7BF-2AEF-0FEA-BF6F-BEAC848E3777}"/>
+                </a:ext>
+              </a:extLst>
+            </p:cNvPr>
+            <p:cNvGrpSpPr/>
+            <p:nvPr/>
+          </p:nvGrpSpPr>
+          <p:grpSpPr>
+            <a:xfrm>
+              <a:off x="1085248" y="3732053"/>
+              <a:ext cx="597425" cy="315531"/>
+              <a:chOff x="1226196" y="1298135"/>
+              <a:chExt cx="597425" cy="315531"/>
+            </a:xfrm>
+          </p:grpSpPr>
+          <p:cxnSp>
+            <p:nvCxnSpPr>
+              <p:cNvPr id="12" name="Straight Arrow Connector 11">
+                <a:extLst>
+                  <a:ext uri="{FF2B5EF4-FFF2-40B4-BE49-F238E27FC236}">
+                    <a16:creationId xmlns:a16="http://schemas.microsoft.com/office/drawing/2014/main" id="{2FD8F842-5ECA-91AB-F6FC-E5F0FB5AE259}"/>
+                  </a:ext>
+                </a:extLst>
+              </p:cNvPr>
+              <p:cNvCxnSpPr>
+                <a:cxnSpLocks/>
+              </p:cNvCxnSpPr>
+              <p:nvPr/>
+            </p:nvCxnSpPr>
+            <p:spPr>
+              <a:xfrm flipH="1">
+                <a:off x="1391621" y="1445549"/>
+                <a:ext cx="432000" cy="0"/>
+              </a:xfrm>
+              <a:prstGeom prst="straightConnector1">
+                <a:avLst/>
+              </a:prstGeom>
+              <a:solidFill>
+                <a:srgbClr val="FFFFFF"/>
+              </a:solidFill>
+              <a:ln w="19050">
+                <a:solidFill>
+                  <a:srgbClr val="0062BA"/>
+                </a:solidFill>
+                <a:headEnd type="oval" w="med" len="med"/>
+                <a:tailEnd type="oval" w="med" len="med"/>
+              </a:ln>
+            </p:spPr>
+            <p:style>
+              <a:lnRef idx="1">
+                <a:schemeClr val="accent1"/>
+              </a:lnRef>
+              <a:fillRef idx="0">
+                <a:schemeClr val="accent1"/>
+              </a:fillRef>
+              <a:effectRef idx="0">
+                <a:schemeClr val="accent1"/>
+              </a:effectRef>
+              <a:fontRef idx="minor">
+                <a:schemeClr val="tx1"/>
+              </a:fontRef>
+            </p:style>
+          </p:cxnSp>
+          <p:sp>
+            <p:nvSpPr>
+              <p:cNvPr id="13" name="Oval 12">
+                <a:extLst>
+                  <a:ext uri="{FF2B5EF4-FFF2-40B4-BE49-F238E27FC236}">
+                    <a16:creationId xmlns:a16="http://schemas.microsoft.com/office/drawing/2014/main" id="{AF5981BD-FE0A-1AD8-976B-643E70466312}"/>
+                  </a:ext>
+                </a:extLst>
+              </p:cNvPr>
+              <p:cNvSpPr/>
+              <p:nvPr/>
+            </p:nvSpPr>
+            <p:spPr>
+              <a:xfrm>
+                <a:off x="1226196" y="1298135"/>
+                <a:ext cx="315531" cy="315531"/>
+              </a:xfrm>
+              <a:prstGeom prst="ellipse">
+                <a:avLst/>
+              </a:prstGeom>
+              <a:solidFill>
+                <a:srgbClr val="FFFFFF"/>
+              </a:solidFill>
+              <a:ln w="19050">
+                <a:solidFill>
+                  <a:srgbClr val="0062BA"/>
+                </a:solidFill>
+              </a:ln>
+            </p:spPr>
+            <p:style>
+              <a:lnRef idx="2">
+                <a:schemeClr val="accent1">
+                  <a:shade val="15000"/>
+                </a:schemeClr>
+              </a:lnRef>
+              <a:fillRef idx="1">
+                <a:schemeClr val="accent1"/>
+              </a:fillRef>
+              <a:effectRef idx="0">
+                <a:schemeClr val="accent1"/>
+              </a:effectRef>
+              <a:fontRef idx="minor">
+                <a:schemeClr val="lt1"/>
+              </a:fontRef>
+            </p:style>
+            <p:txBody>
+              <a:bodyPr rtlCol="0" anchor="ctr"/>
+              <a:lstStyle/>
+              <a:p>
+                <a:pPr algn="ctr"/>
+                <a:r>
+                  <a:rPr lang="en-NO" sz="1400" dirty="0">
+                    <a:solidFill>
+                      <a:srgbClr val="0062BA"/>
+                    </a:solidFill>
+                    <a:latin typeface="DIN Condensed" pitchFamily="2" charset="0"/>
+                  </a:rPr>
+                  <a:t>2</a:t>
+                </a:r>
+              </a:p>
+            </p:txBody>
+          </p:sp>
+        </p:grpSp>
+        <p:grpSp>
+          <p:nvGrpSpPr>
+            <p:cNvPr id="14" name="Group 13">
+              <a:extLst>
+                <a:ext uri="{FF2B5EF4-FFF2-40B4-BE49-F238E27FC236}">
+                  <a16:creationId xmlns:a16="http://schemas.microsoft.com/office/drawing/2014/main" id="{D8625D30-07ED-7796-DE7C-B5BCB7F8AB5E}"/>
+                </a:ext>
+              </a:extLst>
+            </p:cNvPr>
+            <p:cNvGrpSpPr/>
+            <p:nvPr/>
+          </p:nvGrpSpPr>
+          <p:grpSpPr>
+            <a:xfrm>
+              <a:off x="1085248" y="2899897"/>
+              <a:ext cx="597425" cy="315531"/>
+              <a:chOff x="1226196" y="722949"/>
+              <a:chExt cx="597425" cy="315531"/>
+            </a:xfrm>
+          </p:grpSpPr>
+          <p:cxnSp>
+            <p:nvCxnSpPr>
+              <p:cNvPr id="15" name="Straight Arrow Connector 14">
+                <a:extLst>
+                  <a:ext uri="{FF2B5EF4-FFF2-40B4-BE49-F238E27FC236}">
+                    <a16:creationId xmlns:a16="http://schemas.microsoft.com/office/drawing/2014/main" id="{207BD5B6-9612-F5E6-725F-87330B505B75}"/>
+                  </a:ext>
+                </a:extLst>
+              </p:cNvPr>
+              <p:cNvCxnSpPr>
+                <a:cxnSpLocks/>
+              </p:cNvCxnSpPr>
+              <p:nvPr/>
+            </p:nvCxnSpPr>
+            <p:spPr>
+              <a:xfrm flipH="1">
+                <a:off x="1391621" y="870363"/>
+                <a:ext cx="432000" cy="0"/>
+              </a:xfrm>
+              <a:prstGeom prst="straightConnector1">
+                <a:avLst/>
+              </a:prstGeom>
+              <a:solidFill>
+                <a:srgbClr val="FFFFFF"/>
+              </a:solidFill>
+              <a:ln w="19050">
+                <a:solidFill>
+                  <a:srgbClr val="0062BA"/>
+                </a:solidFill>
+                <a:headEnd type="oval" w="med" len="med"/>
+                <a:tailEnd type="oval" w="med" len="med"/>
+              </a:ln>
+            </p:spPr>
+            <p:style>
+              <a:lnRef idx="1">
+                <a:schemeClr val="accent1"/>
+              </a:lnRef>
+              <a:fillRef idx="0">
+                <a:schemeClr val="accent1"/>
+              </a:fillRef>
+              <a:effectRef idx="0">
+                <a:schemeClr val="accent1"/>
+              </a:effectRef>
+              <a:fontRef idx="minor">
+                <a:schemeClr val="tx1"/>
+              </a:fontRef>
+            </p:style>
+          </p:cxnSp>
+          <p:sp>
+            <p:nvSpPr>
+              <p:cNvPr id="16" name="Oval 15">
+                <a:extLst>
+                  <a:ext uri="{FF2B5EF4-FFF2-40B4-BE49-F238E27FC236}">
+                    <a16:creationId xmlns:a16="http://schemas.microsoft.com/office/drawing/2014/main" id="{EBB76E6A-15FD-B252-940F-6745329C14DB}"/>
+                  </a:ext>
+                </a:extLst>
+              </p:cNvPr>
+              <p:cNvSpPr/>
+              <p:nvPr/>
+            </p:nvSpPr>
+            <p:spPr>
+              <a:xfrm>
+                <a:off x="1226196" y="722949"/>
+                <a:ext cx="315531" cy="315531"/>
+              </a:xfrm>
+              <a:prstGeom prst="ellipse">
+                <a:avLst/>
+              </a:prstGeom>
+              <a:solidFill>
+                <a:srgbClr val="FFFFFF"/>
+              </a:solidFill>
+              <a:ln w="19050">
+                <a:solidFill>
+                  <a:srgbClr val="0062BA"/>
+                </a:solidFill>
+              </a:ln>
+            </p:spPr>
+            <p:style>
+              <a:lnRef idx="2">
+                <a:schemeClr val="accent1">
+                  <a:shade val="15000"/>
+                </a:schemeClr>
+              </a:lnRef>
+              <a:fillRef idx="1">
+                <a:schemeClr val="accent1"/>
+              </a:fillRef>
+              <a:effectRef idx="0">
+                <a:schemeClr val="accent1"/>
+              </a:effectRef>
+              <a:fontRef idx="minor">
+                <a:schemeClr val="lt1"/>
+              </a:fontRef>
+            </p:style>
+            <p:txBody>
+              <a:bodyPr rtlCol="0" anchor="ctr"/>
+              <a:lstStyle/>
+              <a:p>
+                <a:pPr algn="ctr"/>
+                <a:r>
+                  <a:rPr lang="en-NO" sz="1400" dirty="0">
+                    <a:solidFill>
+                      <a:srgbClr val="0062BA"/>
+                    </a:solidFill>
+                    <a:latin typeface="DIN Condensed" pitchFamily="2" charset="0"/>
+                  </a:rPr>
+                  <a:t>1</a:t>
+                </a:r>
+              </a:p>
+            </p:txBody>
+          </p:sp>
+        </p:grpSp>
+      </p:grpSp>
+    </p:spTree>
+    <p:extLst>
+      <p:ext uri="{BB962C8B-B14F-4D97-AF65-F5344CB8AC3E}">
+        <p14:creationId xmlns:p14="http://schemas.microsoft.com/office/powerpoint/2010/main" val="1937322771"/>
+      </p:ext>
+    </p:extLst>
+  </p:cSld>
+  <p:clrMapOvr>
+    <a:masterClrMapping/>
+  </p:clrMapOvr>
+</p:sld>
+</file>
+
 <file path=ppt/theme/theme1.xml><?xml version="1.0" encoding="utf-8"?>
 <a:theme xmlns:a="http://schemas.openxmlformats.org/drawingml/2006/main" name="Office Theme">
   <a:themeElements>

</xml_diff>

<commit_message>
Update component docs (#1138)
* Updated AccordionGroup (nb) with template

* Update Alert component

---------

Co-authored-by: Therese Stokkan <therese.stokkan@accenture.com>
</commit_message>
<xml_diff>
--- a/content/app/development/ux/components/numbered-callouts-anatomy.pptx
+++ b/content/app/development/ux/components/numbered-callouts-anatomy.pptx
@@ -9,6 +9,7 @@
     <p:sldId id="257" r:id="rId3"/>
     <p:sldId id="258" r:id="rId4"/>
     <p:sldId id="259" r:id="rId5"/>
+    <p:sldId id="260" r:id="rId6"/>
   </p:sldIdLst>
   <p:sldSz cx="12192000" cy="6858000"/>
   <p:notesSz cx="6858000" cy="9144000"/>
@@ -264,7 +265,7 @@
           <a:p>
             <a:fld id="{8B9FE25B-AA82-4C44-8E19-2BE52C4871CE}" type="datetimeFigureOut">
               <a:rPr lang="en-NO" smtClean="0"/>
-              <a:t>07/09/2023</a:t>
+              <a:t>12/09/2023</a:t>
             </a:fld>
             <a:endParaRPr lang="en-NO"/>
           </a:p>
@@ -464,7 +465,7 @@
           <a:p>
             <a:fld id="{8B9FE25B-AA82-4C44-8E19-2BE52C4871CE}" type="datetimeFigureOut">
               <a:rPr lang="en-NO" smtClean="0"/>
-              <a:t>07/09/2023</a:t>
+              <a:t>12/09/2023</a:t>
             </a:fld>
             <a:endParaRPr lang="en-NO"/>
           </a:p>
@@ -674,7 +675,7 @@
           <a:p>
             <a:fld id="{8B9FE25B-AA82-4C44-8E19-2BE52C4871CE}" type="datetimeFigureOut">
               <a:rPr lang="en-NO" smtClean="0"/>
-              <a:t>07/09/2023</a:t>
+              <a:t>12/09/2023</a:t>
             </a:fld>
             <a:endParaRPr lang="en-NO"/>
           </a:p>
@@ -874,7 +875,7 @@
           <a:p>
             <a:fld id="{8B9FE25B-AA82-4C44-8E19-2BE52C4871CE}" type="datetimeFigureOut">
               <a:rPr lang="en-NO" smtClean="0"/>
-              <a:t>07/09/2023</a:t>
+              <a:t>12/09/2023</a:t>
             </a:fld>
             <a:endParaRPr lang="en-NO"/>
           </a:p>
@@ -1150,7 +1151,7 @@
           <a:p>
             <a:fld id="{8B9FE25B-AA82-4C44-8E19-2BE52C4871CE}" type="datetimeFigureOut">
               <a:rPr lang="en-NO" smtClean="0"/>
-              <a:t>07/09/2023</a:t>
+              <a:t>12/09/2023</a:t>
             </a:fld>
             <a:endParaRPr lang="en-NO"/>
           </a:p>
@@ -1418,7 +1419,7 @@
           <a:p>
             <a:fld id="{8B9FE25B-AA82-4C44-8E19-2BE52C4871CE}" type="datetimeFigureOut">
               <a:rPr lang="en-NO" smtClean="0"/>
-              <a:t>07/09/2023</a:t>
+              <a:t>12/09/2023</a:t>
             </a:fld>
             <a:endParaRPr lang="en-NO"/>
           </a:p>
@@ -1833,7 +1834,7 @@
           <a:p>
             <a:fld id="{8B9FE25B-AA82-4C44-8E19-2BE52C4871CE}" type="datetimeFigureOut">
               <a:rPr lang="en-NO" smtClean="0"/>
-              <a:t>07/09/2023</a:t>
+              <a:t>12/09/2023</a:t>
             </a:fld>
             <a:endParaRPr lang="en-NO"/>
           </a:p>
@@ -1975,7 +1976,7 @@
           <a:p>
             <a:fld id="{8B9FE25B-AA82-4C44-8E19-2BE52C4871CE}" type="datetimeFigureOut">
               <a:rPr lang="en-NO" smtClean="0"/>
-              <a:t>07/09/2023</a:t>
+              <a:t>12/09/2023</a:t>
             </a:fld>
             <a:endParaRPr lang="en-NO"/>
           </a:p>
@@ -2088,7 +2089,7 @@
           <a:p>
             <a:fld id="{8B9FE25B-AA82-4C44-8E19-2BE52C4871CE}" type="datetimeFigureOut">
               <a:rPr lang="en-NO" smtClean="0"/>
-              <a:t>07/09/2023</a:t>
+              <a:t>12/09/2023</a:t>
             </a:fld>
             <a:endParaRPr lang="en-NO"/>
           </a:p>
@@ -2401,7 +2402,7 @@
           <a:p>
             <a:fld id="{8B9FE25B-AA82-4C44-8E19-2BE52C4871CE}" type="datetimeFigureOut">
               <a:rPr lang="en-NO" smtClean="0"/>
-              <a:t>07/09/2023</a:t>
+              <a:t>12/09/2023</a:t>
             </a:fld>
             <a:endParaRPr lang="en-NO"/>
           </a:p>
@@ -2690,7 +2691,7 @@
           <a:p>
             <a:fld id="{8B9FE25B-AA82-4C44-8E19-2BE52C4871CE}" type="datetimeFigureOut">
               <a:rPr lang="en-NO" smtClean="0"/>
-              <a:t>07/09/2023</a:t>
+              <a:t>12/09/2023</a:t>
             </a:fld>
             <a:endParaRPr lang="en-NO"/>
           </a:p>
@@ -2933,7 +2934,7 @@
           <a:p>
             <a:fld id="{8B9FE25B-AA82-4C44-8E19-2BE52C4871CE}" type="datetimeFigureOut">
               <a:rPr lang="en-NO" smtClean="0"/>
-              <a:t>07/09/2023</a:t>
+              <a:t>12/09/2023</a:t>
             </a:fld>
             <a:endParaRPr lang="en-NO"/>
           </a:p>
@@ -6616,6 +6617,480 @@
 </p:sld>
 </file>
 
+<file path=ppt/slides/slide5.xml><?xml version="1.0" encoding="utf-8"?>
+<p:sld xmlns:a="http://schemas.openxmlformats.org/drawingml/2006/main" xmlns:r="http://schemas.openxmlformats.org/officeDocument/2006/relationships" xmlns:p="http://schemas.openxmlformats.org/presentationml/2006/main">
+  <p:cSld>
+    <p:spTree>
+      <p:nvGrpSpPr>
+        <p:cNvPr id="1" name=""/>
+        <p:cNvGrpSpPr/>
+        <p:nvPr/>
+      </p:nvGrpSpPr>
+      <p:grpSpPr>
+        <a:xfrm>
+          <a:off x="0" y="0"/>
+          <a:ext cx="0" cy="0"/>
+          <a:chOff x="0" y="0"/>
+          <a:chExt cx="0" cy="0"/>
+        </a:xfrm>
+      </p:grpSpPr>
+      <p:grpSp>
+        <p:nvGrpSpPr>
+          <p:cNvPr id="17" name="Group 16">
+            <a:extLst>
+              <a:ext uri="{FF2B5EF4-FFF2-40B4-BE49-F238E27FC236}">
+                <a16:creationId xmlns:a16="http://schemas.microsoft.com/office/drawing/2014/main" id="{CF2C8BD3-1230-2486-C1D7-E4EF62C6AA3F}"/>
+              </a:ext>
+            </a:extLst>
+          </p:cNvPr>
+          <p:cNvGrpSpPr/>
+          <p:nvPr/>
+        </p:nvGrpSpPr>
+        <p:grpSpPr>
+          <a:xfrm>
+            <a:off x="2388046" y="2544509"/>
+            <a:ext cx="6990904" cy="1767260"/>
+            <a:chOff x="2388046" y="2544509"/>
+            <a:chExt cx="6990904" cy="1767260"/>
+          </a:xfrm>
+        </p:grpSpPr>
+        <p:pic>
+          <p:nvPicPr>
+            <p:cNvPr id="5" name="Picture 4" descr="A close up of a text&#10;&#10;Description automatically generated">
+              <a:extLst>
+                <a:ext uri="{FF2B5EF4-FFF2-40B4-BE49-F238E27FC236}">
+                  <a16:creationId xmlns:a16="http://schemas.microsoft.com/office/drawing/2014/main" id="{2B4F2DB1-226F-02B8-316C-F494413491F8}"/>
+                </a:ext>
+              </a:extLst>
+            </p:cNvPr>
+            <p:cNvPicPr>
+              <a:picLocks noChangeAspect="1"/>
+            </p:cNvPicPr>
+            <p:nvPr/>
+          </p:nvPicPr>
+          <p:blipFill>
+            <a:blip r:embed="rId2"/>
+            <a:stretch>
+              <a:fillRect/>
+            </a:stretch>
+          </p:blipFill>
+          <p:spPr>
+            <a:xfrm>
+              <a:off x="2813050" y="3009900"/>
+              <a:ext cx="6565900" cy="838200"/>
+            </a:xfrm>
+            <a:prstGeom prst="rect">
+              <a:avLst/>
+            </a:prstGeom>
+          </p:spPr>
+        </p:pic>
+        <p:grpSp>
+          <p:nvGrpSpPr>
+            <p:cNvPr id="6" name="Group 5">
+              <a:extLst>
+                <a:ext uri="{FF2B5EF4-FFF2-40B4-BE49-F238E27FC236}">
+                  <a16:creationId xmlns:a16="http://schemas.microsoft.com/office/drawing/2014/main" id="{892E0399-E64C-74EC-FA26-3FDAC4984B1F}"/>
+                </a:ext>
+              </a:extLst>
+            </p:cNvPr>
+            <p:cNvGrpSpPr/>
+            <p:nvPr/>
+          </p:nvGrpSpPr>
+          <p:grpSpPr>
+            <a:xfrm>
+              <a:off x="3908436" y="2544509"/>
+              <a:ext cx="315531" cy="574611"/>
+              <a:chOff x="1226196" y="722949"/>
+              <a:chExt cx="315531" cy="574611"/>
+            </a:xfrm>
+          </p:grpSpPr>
+          <p:cxnSp>
+            <p:nvCxnSpPr>
+              <p:cNvPr id="7" name="Straight Arrow Connector 6">
+                <a:extLst>
+                  <a:ext uri="{FF2B5EF4-FFF2-40B4-BE49-F238E27FC236}">
+                    <a16:creationId xmlns:a16="http://schemas.microsoft.com/office/drawing/2014/main" id="{75A4E115-E57A-98B2-1E50-139E194494DC}"/>
+                  </a:ext>
+                </a:extLst>
+              </p:cNvPr>
+              <p:cNvCxnSpPr>
+                <a:cxnSpLocks/>
+              </p:cNvCxnSpPr>
+              <p:nvPr/>
+            </p:nvCxnSpPr>
+            <p:spPr>
+              <a:xfrm flipV="1">
+                <a:off x="1391621" y="870363"/>
+                <a:ext cx="0" cy="427197"/>
+              </a:xfrm>
+              <a:prstGeom prst="straightConnector1">
+                <a:avLst/>
+              </a:prstGeom>
+              <a:solidFill>
+                <a:srgbClr val="FFFFFF"/>
+              </a:solidFill>
+              <a:ln w="19050">
+                <a:solidFill>
+                  <a:srgbClr val="0062BA"/>
+                </a:solidFill>
+                <a:headEnd type="oval" w="med" len="med"/>
+                <a:tailEnd type="oval" w="med" len="med"/>
+              </a:ln>
+            </p:spPr>
+            <p:style>
+              <a:lnRef idx="1">
+                <a:schemeClr val="accent1"/>
+              </a:lnRef>
+              <a:fillRef idx="0">
+                <a:schemeClr val="accent1"/>
+              </a:fillRef>
+              <a:effectRef idx="0">
+                <a:schemeClr val="accent1"/>
+              </a:effectRef>
+              <a:fontRef idx="minor">
+                <a:schemeClr val="tx1"/>
+              </a:fontRef>
+            </p:style>
+          </p:cxnSp>
+          <p:sp>
+            <p:nvSpPr>
+              <p:cNvPr id="8" name="Oval 7">
+                <a:extLst>
+                  <a:ext uri="{FF2B5EF4-FFF2-40B4-BE49-F238E27FC236}">
+                    <a16:creationId xmlns:a16="http://schemas.microsoft.com/office/drawing/2014/main" id="{4FECFE4F-C759-813F-1BAF-BEE7DD667118}"/>
+                  </a:ext>
+                </a:extLst>
+              </p:cNvPr>
+              <p:cNvSpPr/>
+              <p:nvPr/>
+            </p:nvSpPr>
+            <p:spPr>
+              <a:xfrm>
+                <a:off x="1226196" y="722949"/>
+                <a:ext cx="315531" cy="315531"/>
+              </a:xfrm>
+              <a:prstGeom prst="ellipse">
+                <a:avLst/>
+              </a:prstGeom>
+              <a:solidFill>
+                <a:srgbClr val="FFFFFF"/>
+              </a:solidFill>
+              <a:ln w="19050">
+                <a:solidFill>
+                  <a:srgbClr val="0062BA"/>
+                </a:solidFill>
+              </a:ln>
+            </p:spPr>
+            <p:style>
+              <a:lnRef idx="2">
+                <a:schemeClr val="accent1">
+                  <a:shade val="15000"/>
+                </a:schemeClr>
+              </a:lnRef>
+              <a:fillRef idx="1">
+                <a:schemeClr val="accent1"/>
+              </a:fillRef>
+              <a:effectRef idx="0">
+                <a:schemeClr val="accent1"/>
+              </a:effectRef>
+              <a:fontRef idx="minor">
+                <a:schemeClr val="lt1"/>
+              </a:fontRef>
+            </p:style>
+            <p:txBody>
+              <a:bodyPr rtlCol="0" anchor="ctr"/>
+              <a:lstStyle/>
+              <a:p>
+                <a:pPr algn="ctr"/>
+                <a:r>
+                  <a:rPr lang="en-NO" sz="1400" dirty="0">
+                    <a:solidFill>
+                      <a:srgbClr val="0062BA"/>
+                    </a:solidFill>
+                    <a:latin typeface="DIN Condensed" pitchFamily="2" charset="0"/>
+                  </a:rPr>
+                  <a:t>1</a:t>
+                </a:r>
+              </a:p>
+            </p:txBody>
+          </p:sp>
+        </p:grpSp>
+        <p:grpSp>
+          <p:nvGrpSpPr>
+            <p:cNvPr id="9" name="Group 8">
+              <a:extLst>
+                <a:ext uri="{FF2B5EF4-FFF2-40B4-BE49-F238E27FC236}">
+                  <a16:creationId xmlns:a16="http://schemas.microsoft.com/office/drawing/2014/main" id="{F1D4DCD1-C85E-D2CA-FDFC-088F52E0C63C}"/>
+                </a:ext>
+              </a:extLst>
+            </p:cNvPr>
+            <p:cNvGrpSpPr/>
+            <p:nvPr/>
+          </p:nvGrpSpPr>
+          <p:grpSpPr>
+            <a:xfrm>
+              <a:off x="2388046" y="3145101"/>
+              <a:ext cx="597425" cy="315531"/>
+              <a:chOff x="1226196" y="1298135"/>
+              <a:chExt cx="597425" cy="315531"/>
+            </a:xfrm>
+          </p:grpSpPr>
+          <p:cxnSp>
+            <p:nvCxnSpPr>
+              <p:cNvPr id="10" name="Straight Arrow Connector 9">
+                <a:extLst>
+                  <a:ext uri="{FF2B5EF4-FFF2-40B4-BE49-F238E27FC236}">
+                    <a16:creationId xmlns:a16="http://schemas.microsoft.com/office/drawing/2014/main" id="{ABF0E1DB-AFCE-7BCE-E403-4ABB18521C05}"/>
+                  </a:ext>
+                </a:extLst>
+              </p:cNvPr>
+              <p:cNvCxnSpPr>
+                <a:cxnSpLocks/>
+              </p:cNvCxnSpPr>
+              <p:nvPr/>
+            </p:nvCxnSpPr>
+            <p:spPr>
+              <a:xfrm flipH="1">
+                <a:off x="1391621" y="1445549"/>
+                <a:ext cx="432000" cy="0"/>
+              </a:xfrm>
+              <a:prstGeom prst="straightConnector1">
+                <a:avLst/>
+              </a:prstGeom>
+              <a:solidFill>
+                <a:srgbClr val="FFFFFF"/>
+              </a:solidFill>
+              <a:ln w="19050">
+                <a:solidFill>
+                  <a:srgbClr val="0062BA"/>
+                </a:solidFill>
+                <a:headEnd type="oval" w="med" len="med"/>
+                <a:tailEnd type="oval" w="med" len="med"/>
+              </a:ln>
+            </p:spPr>
+            <p:style>
+              <a:lnRef idx="1">
+                <a:schemeClr val="accent1"/>
+              </a:lnRef>
+              <a:fillRef idx="0">
+                <a:schemeClr val="accent1"/>
+              </a:fillRef>
+              <a:effectRef idx="0">
+                <a:schemeClr val="accent1"/>
+              </a:effectRef>
+              <a:fontRef idx="minor">
+                <a:schemeClr val="tx1"/>
+              </a:fontRef>
+            </p:style>
+          </p:cxnSp>
+          <p:sp>
+            <p:nvSpPr>
+              <p:cNvPr id="11" name="Oval 10">
+                <a:extLst>
+                  <a:ext uri="{FF2B5EF4-FFF2-40B4-BE49-F238E27FC236}">
+                    <a16:creationId xmlns:a16="http://schemas.microsoft.com/office/drawing/2014/main" id="{323DA8CD-993E-6C0B-8AE2-6540C0F53922}"/>
+                  </a:ext>
+                </a:extLst>
+              </p:cNvPr>
+              <p:cNvSpPr/>
+              <p:nvPr/>
+            </p:nvSpPr>
+            <p:spPr>
+              <a:xfrm>
+                <a:off x="1226196" y="1298135"/>
+                <a:ext cx="315531" cy="315531"/>
+              </a:xfrm>
+              <a:prstGeom prst="ellipse">
+                <a:avLst/>
+              </a:prstGeom>
+              <a:solidFill>
+                <a:srgbClr val="FFFFFF"/>
+              </a:solidFill>
+              <a:ln w="19050">
+                <a:solidFill>
+                  <a:srgbClr val="0062BA"/>
+                </a:solidFill>
+              </a:ln>
+            </p:spPr>
+            <p:style>
+              <a:lnRef idx="2">
+                <a:schemeClr val="accent1">
+                  <a:shade val="15000"/>
+                </a:schemeClr>
+              </a:lnRef>
+              <a:fillRef idx="1">
+                <a:schemeClr val="accent1"/>
+              </a:fillRef>
+              <a:effectRef idx="0">
+                <a:schemeClr val="accent1"/>
+              </a:effectRef>
+              <a:fontRef idx="minor">
+                <a:schemeClr val="lt1"/>
+              </a:fontRef>
+            </p:style>
+            <p:txBody>
+              <a:bodyPr rtlCol="0" anchor="ctr"/>
+              <a:lstStyle/>
+              <a:p>
+                <a:pPr algn="ctr"/>
+                <a:r>
+                  <a:rPr lang="en-NO" sz="1400" dirty="0">
+                    <a:solidFill>
+                      <a:srgbClr val="0062BA"/>
+                    </a:solidFill>
+                    <a:latin typeface="DIN Condensed" pitchFamily="2" charset="0"/>
+                  </a:rPr>
+                  <a:t>2</a:t>
+                </a:r>
+              </a:p>
+            </p:txBody>
+          </p:sp>
+        </p:grpSp>
+        <p:grpSp>
+          <p:nvGrpSpPr>
+            <p:cNvPr id="12" name="Group 11">
+              <a:extLst>
+                <a:ext uri="{FF2B5EF4-FFF2-40B4-BE49-F238E27FC236}">
+                  <a16:creationId xmlns:a16="http://schemas.microsoft.com/office/drawing/2014/main" id="{71ABD151-60C7-D922-27A4-BA3679EEDD39}"/>
+                </a:ext>
+              </a:extLst>
+            </p:cNvPr>
+            <p:cNvGrpSpPr/>
+            <p:nvPr/>
+          </p:nvGrpSpPr>
+          <p:grpSpPr>
+            <a:xfrm>
+              <a:off x="4883796" y="3746500"/>
+              <a:ext cx="315531" cy="565269"/>
+              <a:chOff x="1226196" y="1592580"/>
+              <a:chExt cx="315531" cy="565269"/>
+            </a:xfrm>
+          </p:grpSpPr>
+          <p:cxnSp>
+            <p:nvCxnSpPr>
+              <p:cNvPr id="13" name="Straight Arrow Connector 12">
+                <a:extLst>
+                  <a:ext uri="{FF2B5EF4-FFF2-40B4-BE49-F238E27FC236}">
+                    <a16:creationId xmlns:a16="http://schemas.microsoft.com/office/drawing/2014/main" id="{5D825BF4-2A6E-B80C-5193-E21AAFE4CEAB}"/>
+                  </a:ext>
+                </a:extLst>
+              </p:cNvPr>
+              <p:cNvCxnSpPr>
+                <a:cxnSpLocks/>
+              </p:cNvCxnSpPr>
+              <p:nvPr/>
+            </p:nvCxnSpPr>
+            <p:spPr>
+              <a:xfrm flipV="1">
+                <a:off x="1391621" y="1592580"/>
+                <a:ext cx="0" cy="432000"/>
+              </a:xfrm>
+              <a:prstGeom prst="straightConnector1">
+                <a:avLst/>
+              </a:prstGeom>
+              <a:solidFill>
+                <a:srgbClr val="FFFFFF"/>
+              </a:solidFill>
+              <a:ln w="19050">
+                <a:solidFill>
+                  <a:srgbClr val="0062BA"/>
+                </a:solidFill>
+                <a:headEnd type="oval" w="med" len="med"/>
+                <a:tailEnd type="oval" w="med" len="med"/>
+              </a:ln>
+            </p:spPr>
+            <p:style>
+              <a:lnRef idx="1">
+                <a:schemeClr val="accent1"/>
+              </a:lnRef>
+              <a:fillRef idx="0">
+                <a:schemeClr val="accent1"/>
+              </a:fillRef>
+              <a:effectRef idx="0">
+                <a:schemeClr val="accent1"/>
+              </a:effectRef>
+              <a:fontRef idx="minor">
+                <a:schemeClr val="tx1"/>
+              </a:fontRef>
+            </p:style>
+          </p:cxnSp>
+          <p:sp>
+            <p:nvSpPr>
+              <p:cNvPr id="14" name="Oval 13">
+                <a:extLst>
+                  <a:ext uri="{FF2B5EF4-FFF2-40B4-BE49-F238E27FC236}">
+                    <a16:creationId xmlns:a16="http://schemas.microsoft.com/office/drawing/2014/main" id="{1C5C4CED-1D6D-20AF-6945-6E60DD67DE85}"/>
+                  </a:ext>
+                </a:extLst>
+              </p:cNvPr>
+              <p:cNvSpPr/>
+              <p:nvPr/>
+            </p:nvSpPr>
+            <p:spPr>
+              <a:xfrm>
+                <a:off x="1226196" y="1842318"/>
+                <a:ext cx="315531" cy="315531"/>
+              </a:xfrm>
+              <a:prstGeom prst="ellipse">
+                <a:avLst/>
+              </a:prstGeom>
+              <a:solidFill>
+                <a:srgbClr val="FFFFFF"/>
+              </a:solidFill>
+              <a:ln w="19050">
+                <a:solidFill>
+                  <a:srgbClr val="0062BA"/>
+                </a:solidFill>
+              </a:ln>
+            </p:spPr>
+            <p:style>
+              <a:lnRef idx="2">
+                <a:schemeClr val="accent1">
+                  <a:shade val="15000"/>
+                </a:schemeClr>
+              </a:lnRef>
+              <a:fillRef idx="1">
+                <a:schemeClr val="accent1"/>
+              </a:fillRef>
+              <a:effectRef idx="0">
+                <a:schemeClr val="accent1"/>
+              </a:effectRef>
+              <a:fontRef idx="minor">
+                <a:schemeClr val="lt1"/>
+              </a:fontRef>
+            </p:style>
+            <p:txBody>
+              <a:bodyPr rtlCol="0" anchor="ctr"/>
+              <a:lstStyle/>
+              <a:p>
+                <a:pPr algn="ctr"/>
+                <a:r>
+                  <a:rPr lang="en-NO" sz="1400" dirty="0">
+                    <a:solidFill>
+                      <a:srgbClr val="0062BA"/>
+                    </a:solidFill>
+                    <a:latin typeface="DIN Condensed" pitchFamily="2" charset="0"/>
+                  </a:rPr>
+                  <a:t>3</a:t>
+                </a:r>
+              </a:p>
+            </p:txBody>
+          </p:sp>
+        </p:grpSp>
+      </p:grpSp>
+    </p:spTree>
+    <p:extLst>
+      <p:ext uri="{BB962C8B-B14F-4D97-AF65-F5344CB8AC3E}">
+        <p14:creationId xmlns:p14="http://schemas.microsoft.com/office/powerpoint/2010/main" val="1474335977"/>
+      </p:ext>
+    </p:extLst>
+  </p:cSld>
+  <p:clrMapOvr>
+    <a:masterClrMapping/>
+  </p:clrMapOvr>
+</p:sld>
+</file>
+
 <file path=ppt/theme/theme1.xml><?xml version="1.0" encoding="utf-8"?>
 <a:theme xmlns:a="http://schemas.openxmlformats.org/drawingml/2006/main" name="Office Theme">
   <a:themeElements>

</xml_diff>